<commit_message>
fix: Ajusta nav e footer
</commit_message>
<xml_diff>
--- a/img/logos/ministerios/logos.pptx
+++ b/img/logos/ministerios/logos.pptx
@@ -302,7 +302,7 @@
           <a:p>
             <a:fld id="{DF12F4A2-6B64-4D67-9532-1D13C41B2042}" type="datetimeFigureOut">
               <a:rPr lang="pt-BR" smtClean="0"/>
-              <a:t>11/04/2020</a:t>
+              <a:t>12/04/2020</a:t>
             </a:fld>
             <a:endParaRPr lang="pt-BR"/>
           </a:p>
@@ -473,7 +473,7 @@
           <a:p>
             <a:fld id="{DF12F4A2-6B64-4D67-9532-1D13C41B2042}" type="datetimeFigureOut">
               <a:rPr lang="pt-BR" smtClean="0"/>
-              <a:t>11/04/2020</a:t>
+              <a:t>12/04/2020</a:t>
             </a:fld>
             <a:endParaRPr lang="pt-BR"/>
           </a:p>
@@ -654,7 +654,7 @@
           <a:p>
             <a:fld id="{DF12F4A2-6B64-4D67-9532-1D13C41B2042}" type="datetimeFigureOut">
               <a:rPr lang="pt-BR" smtClean="0"/>
-              <a:t>11/04/2020</a:t>
+              <a:t>12/04/2020</a:t>
             </a:fld>
             <a:endParaRPr lang="pt-BR"/>
           </a:p>
@@ -825,7 +825,7 @@
           <a:p>
             <a:fld id="{DF12F4A2-6B64-4D67-9532-1D13C41B2042}" type="datetimeFigureOut">
               <a:rPr lang="pt-BR" smtClean="0"/>
-              <a:t>11/04/2020</a:t>
+              <a:t>12/04/2020</a:t>
             </a:fld>
             <a:endParaRPr lang="pt-BR"/>
           </a:p>
@@ -1073,7 +1073,7 @@
           <a:p>
             <a:fld id="{DF12F4A2-6B64-4D67-9532-1D13C41B2042}" type="datetimeFigureOut">
               <a:rPr lang="pt-BR" smtClean="0"/>
-              <a:t>11/04/2020</a:t>
+              <a:t>12/04/2020</a:t>
             </a:fld>
             <a:endParaRPr lang="pt-BR"/>
           </a:p>
@@ -1361,7 +1361,7 @@
           <a:p>
             <a:fld id="{DF12F4A2-6B64-4D67-9532-1D13C41B2042}" type="datetimeFigureOut">
               <a:rPr lang="pt-BR" smtClean="0"/>
-              <a:t>11/04/2020</a:t>
+              <a:t>12/04/2020</a:t>
             </a:fld>
             <a:endParaRPr lang="pt-BR"/>
           </a:p>
@@ -1783,7 +1783,7 @@
           <a:p>
             <a:fld id="{DF12F4A2-6B64-4D67-9532-1D13C41B2042}" type="datetimeFigureOut">
               <a:rPr lang="pt-BR" smtClean="0"/>
-              <a:t>11/04/2020</a:t>
+              <a:t>12/04/2020</a:t>
             </a:fld>
             <a:endParaRPr lang="pt-BR"/>
           </a:p>
@@ -1903,7 +1903,7 @@
           <a:p>
             <a:fld id="{DF12F4A2-6B64-4D67-9532-1D13C41B2042}" type="datetimeFigureOut">
               <a:rPr lang="pt-BR" smtClean="0"/>
-              <a:t>11/04/2020</a:t>
+              <a:t>12/04/2020</a:t>
             </a:fld>
             <a:endParaRPr lang="pt-BR"/>
           </a:p>
@@ -2001,7 +2001,7 @@
           <a:p>
             <a:fld id="{DF12F4A2-6B64-4D67-9532-1D13C41B2042}" type="datetimeFigureOut">
               <a:rPr lang="pt-BR" smtClean="0"/>
-              <a:t>11/04/2020</a:t>
+              <a:t>12/04/2020</a:t>
             </a:fld>
             <a:endParaRPr lang="pt-BR"/>
           </a:p>
@@ -2279,7 +2279,7 @@
           <a:p>
             <a:fld id="{DF12F4A2-6B64-4D67-9532-1D13C41B2042}" type="datetimeFigureOut">
               <a:rPr lang="pt-BR" smtClean="0"/>
-              <a:t>11/04/2020</a:t>
+              <a:t>12/04/2020</a:t>
             </a:fld>
             <a:endParaRPr lang="pt-BR"/>
           </a:p>
@@ -2534,7 +2534,7 @@
           <a:p>
             <a:fld id="{DF12F4A2-6B64-4D67-9532-1D13C41B2042}" type="datetimeFigureOut">
               <a:rPr lang="pt-BR" smtClean="0"/>
-              <a:t>11/04/2020</a:t>
+              <a:t>12/04/2020</a:t>
             </a:fld>
             <a:endParaRPr lang="pt-BR"/>
           </a:p>
@@ -2751,7 +2751,7 @@
           <a:p>
             <a:fld id="{DF12F4A2-6B64-4D67-9532-1D13C41B2042}" type="datetimeFigureOut">
               <a:rPr lang="pt-BR" smtClean="0"/>
-              <a:t>11/04/2020</a:t>
+              <a:t>12/04/2020</a:t>
             </a:fld>
             <a:endParaRPr lang="pt-BR"/>
           </a:p>
@@ -3435,119 +3435,140 @@
           </a:p>
         </p:txBody>
       </p:sp>
-      <p:pic>
-        <p:nvPicPr>
-          <p:cNvPr id="20" name="Imagem 19">
+      <p:grpSp>
+        <p:nvGrpSpPr>
+          <p:cNvPr id="4" name="Agrupar 3">
             <a:extLst>
               <a:ext uri="{FF2B5EF4-FFF2-40B4-BE49-F238E27FC236}">
-                <a16:creationId xmlns:a16="http://schemas.microsoft.com/office/drawing/2014/main" id="{58FF8C79-6649-4271-B6AF-E0E2BAAA90BB}"/>
+                <a16:creationId xmlns:a16="http://schemas.microsoft.com/office/drawing/2014/main" id="{EDB0A030-C1E8-45CB-AC02-FB7D37D32B87}"/>
               </a:ext>
             </a:extLst>
           </p:cNvPr>
-          <p:cNvPicPr>
-            <a:picLocks noChangeAspect="1"/>
-          </p:cNvPicPr>
+          <p:cNvGrpSpPr/>
           <p:nvPr/>
-        </p:nvPicPr>
-        <p:blipFill>
-          <a:blip r:embed="rId2" cstate="print">
-            <a:extLst>
-              <a:ext uri="{28A0092B-C50C-407E-A947-70E740481C1C}">
-                <a14:useLocalDpi xmlns:a14="http://schemas.microsoft.com/office/drawing/2010/main" val="0"/>
-              </a:ext>
-            </a:extLst>
-          </a:blip>
-          <a:stretch>
-            <a:fillRect/>
-          </a:stretch>
-        </p:blipFill>
-        <p:spPr>
+        </p:nvGrpSpPr>
+        <p:grpSpPr>
           <a:xfrm>
             <a:off x="956323" y="6880707"/>
-            <a:ext cx="2520280" cy="1655591"/>
+            <a:ext cx="9670289" cy="1655591"/>
+            <a:chOff x="956323" y="6880707"/>
+            <a:chExt cx="9670289" cy="1655591"/>
           </a:xfrm>
-          <a:prstGeom prst="rect">
-            <a:avLst/>
-          </a:prstGeom>
-          <a:ln>
+        </p:grpSpPr>
+        <p:pic>
+          <p:nvPicPr>
+            <p:cNvPr id="20" name="Imagem 19">
+              <a:extLst>
+                <a:ext uri="{FF2B5EF4-FFF2-40B4-BE49-F238E27FC236}">
+                  <a16:creationId xmlns:a16="http://schemas.microsoft.com/office/drawing/2014/main" id="{58FF8C79-6649-4271-B6AF-E0E2BAAA90BB}"/>
+                </a:ext>
+              </a:extLst>
+            </p:cNvPr>
+            <p:cNvPicPr>
+              <a:picLocks noChangeAspect="1"/>
+            </p:cNvPicPr>
+            <p:nvPr/>
+          </p:nvPicPr>
+          <p:blipFill>
+            <a:blip r:embed="rId2" cstate="print">
+              <a:extLst>
+                <a:ext uri="{28A0092B-C50C-407E-A947-70E740481C1C}">
+                  <a14:useLocalDpi xmlns:a14="http://schemas.microsoft.com/office/drawing/2010/main" val="0"/>
+                </a:ext>
+              </a:extLst>
+            </a:blip>
+            <a:stretch>
+              <a:fillRect/>
+            </a:stretch>
+          </p:blipFill>
+          <p:spPr>
+            <a:xfrm>
+              <a:off x="956323" y="6880707"/>
+              <a:ext cx="2520280" cy="1655591"/>
+            </a:xfrm>
+            <a:prstGeom prst="rect">
+              <a:avLst/>
+            </a:prstGeom>
+            <a:ln>
+              <a:noFill/>
+            </a:ln>
+            <a:effectLst>
+              <a:outerShdw blurRad="50800" dist="38100" dir="2700000" algn="tl" rotWithShape="0">
+                <a:prstClr val="black">
+                  <a:alpha val="40000"/>
+                </a:prstClr>
+              </a:outerShdw>
+            </a:effectLst>
+          </p:spPr>
+        </p:pic>
+        <p:sp>
+          <p:nvSpPr>
+            <p:cNvPr id="21" name="CaixaDeTexto 20">
+              <a:extLst>
+                <a:ext uri="{FF2B5EF4-FFF2-40B4-BE49-F238E27FC236}">
+                  <a16:creationId xmlns:a16="http://schemas.microsoft.com/office/drawing/2014/main" id="{EAFEDDC4-CCEB-46EB-BC90-4DDDFED56B28}"/>
+                </a:ext>
+              </a:extLst>
+            </p:cNvPr>
+            <p:cNvSpPr txBox="1"/>
+            <p:nvPr/>
+          </p:nvSpPr>
+          <p:spPr>
+            <a:xfrm>
+              <a:off x="1873251" y="6981497"/>
+              <a:ext cx="8753361" cy="1446550"/>
+            </a:xfrm>
+            <a:prstGeom prst="rect">
+              <a:avLst/>
+            </a:prstGeom>
             <a:noFill/>
-          </a:ln>
-          <a:effectLst>
-            <a:outerShdw blurRad="50800" dist="38100" dir="2700000" algn="tl" rotWithShape="0">
-              <a:prstClr val="black">
-                <a:alpha val="40000"/>
-              </a:prstClr>
-            </a:outerShdw>
-          </a:effectLst>
-        </p:spPr>
-      </p:pic>
-      <p:sp>
-        <p:nvSpPr>
-          <p:cNvPr id="21" name="CaixaDeTexto 20">
-            <a:extLst>
-              <a:ext uri="{FF2B5EF4-FFF2-40B4-BE49-F238E27FC236}">
-                <a16:creationId xmlns:a16="http://schemas.microsoft.com/office/drawing/2014/main" id="{EAFEDDC4-CCEB-46EB-BC90-4DDDFED56B28}"/>
-              </a:ext>
-            </a:extLst>
-          </p:cNvPr>
-          <p:cNvSpPr txBox="1"/>
-          <p:nvPr/>
-        </p:nvSpPr>
-        <p:spPr>
-          <a:xfrm>
-            <a:off x="1873251" y="6981497"/>
-            <a:ext cx="8753361" cy="1446550"/>
-          </a:xfrm>
-          <a:prstGeom prst="rect">
-            <a:avLst/>
-          </a:prstGeom>
-          <a:noFill/>
-        </p:spPr>
-        <p:txBody>
-          <a:bodyPr wrap="square" rtlCol="0">
-            <a:spAutoFit/>
-          </a:bodyPr>
-          <a:lstStyle/>
-          <a:p>
-            <a:pPr algn="ctr"/>
-            <a:r>
-              <a:rPr lang="pt-BR" sz="4400" spc="300" dirty="0">
-                <a:solidFill>
-                  <a:schemeClr val="bg1"/>
-                </a:solidFill>
-                <a:effectLst>
-                  <a:outerShdw blurRad="38100" dist="38100" dir="2700000" algn="tl">
-                    <a:srgbClr val="000000">
-                      <a:alpha val="43137"/>
-                    </a:srgbClr>
-                  </a:outerShdw>
-                </a:effectLst>
-                <a:latin typeface="Constantia" panose="02030602050306030303" pitchFamily="18" charset="0"/>
-              </a:rPr>
-              <a:t>Igreja Cristã </a:t>
-            </a:r>
-          </a:p>
-          <a:p>
-            <a:pPr algn="ctr"/>
-            <a:r>
-              <a:rPr lang="pt-BR" sz="4400" spc="300" dirty="0">
-                <a:solidFill>
-                  <a:schemeClr val="bg1"/>
-                </a:solidFill>
-                <a:effectLst>
-                  <a:outerShdw blurRad="38100" dist="38100" dir="2700000" algn="tl">
-                    <a:srgbClr val="000000">
-                      <a:alpha val="43137"/>
-                    </a:srgbClr>
-                  </a:outerShdw>
-                </a:effectLst>
-                <a:latin typeface="Constantia" panose="02030602050306030303" pitchFamily="18" charset="0"/>
-              </a:rPr>
-              <a:t>Nova Vida de Magé</a:t>
-            </a:r>
-          </a:p>
-        </p:txBody>
-      </p:sp>
+          </p:spPr>
+          <p:txBody>
+            <a:bodyPr wrap="square" rtlCol="0">
+              <a:spAutoFit/>
+            </a:bodyPr>
+            <a:lstStyle/>
+            <a:p>
+              <a:pPr algn="ctr"/>
+              <a:r>
+                <a:rPr lang="pt-BR" sz="4400" spc="300" dirty="0">
+                  <a:solidFill>
+                    <a:schemeClr val="bg1"/>
+                  </a:solidFill>
+                  <a:effectLst>
+                    <a:outerShdw blurRad="38100" dist="38100" dir="2700000" algn="tl">
+                      <a:srgbClr val="000000">
+                        <a:alpha val="43137"/>
+                      </a:srgbClr>
+                    </a:outerShdw>
+                  </a:effectLst>
+                  <a:latin typeface="Constantia" panose="02030602050306030303" pitchFamily="18" charset="0"/>
+                </a:rPr>
+                <a:t>Igreja Cristã </a:t>
+              </a:r>
+            </a:p>
+            <a:p>
+              <a:pPr algn="ctr"/>
+              <a:r>
+                <a:rPr lang="pt-BR" sz="4400" spc="300" dirty="0">
+                  <a:solidFill>
+                    <a:schemeClr val="bg1"/>
+                  </a:solidFill>
+                  <a:effectLst>
+                    <a:outerShdw blurRad="38100" dist="38100" dir="2700000" algn="tl">
+                      <a:srgbClr val="000000">
+                        <a:alpha val="43137"/>
+                      </a:srgbClr>
+                    </a:outerShdw>
+                  </a:effectLst>
+                  <a:latin typeface="Constantia" panose="02030602050306030303" pitchFamily="18" charset="0"/>
+                </a:rPr>
+                <a:t>Nova Vida de Magé</a:t>
+              </a:r>
+            </a:p>
+          </p:txBody>
+        </p:sp>
+      </p:grpSp>
       <p:pic>
         <p:nvPicPr>
           <p:cNvPr id="17" name="Imagem 16">

</xml_diff>